<commit_message>
Push of an edited version of Slides
</commit_message>
<xml_diff>
--- a/JsonConverter/src/main/resources/OutputFolder/test.pptx
+++ b/JsonConverter/src/main/resources/OutputFolder/test.pptx
@@ -7,6 +7,7 @@
   <p:sldIdLst>
     <p:sldId id="256" r:id="rId6"/>
     <p:sldId id="257" r:id="rId7"/>
+    <p:sldId id="258" r:id="rId8"/>
   </p:sldIdLst>
   <p:sldSz cx="9144000" cy="6858000" type="screen4x3"/>
   <p:notesSz cx="6858000" cy="9144000"/>
@@ -3174,6 +3175,78 @@
             <a:r>
               <a:rPr lang="en-US"/>
               <a:t>Oh no!!!</a:t>
+            </a:r>
+            <a:endParaRPr lang="en-US" smtClean="0"/>
+          </a:p>
+        </p:txBody>
+      </p:sp>
+    </p:spTree>
+  </p:cSld>
+  <p:clrMapOvr>
+    <a:masterClrMapping/>
+  </p:clrMapOvr>
+</p:sld>
+</file>
+
+<file path=ppt/slides/slide3.xml><?xml version="1.0" encoding="utf-8"?>
+<p:sld xmlns:p="http://schemas.openxmlformats.org/presentationml/2006/main" xmlns:a="http://schemas.openxmlformats.org/drawingml/2006/main">
+  <p:cSld>
+    <p:spTree>
+      <p:nvGrpSpPr>
+        <p:cNvPr id="1" name=""/>
+        <p:cNvGrpSpPr/>
+        <p:nvPr/>
+      </p:nvGrpSpPr>
+      <p:grpSpPr>
+        <a:xfrm>
+          <a:off x="0" y="0"/>
+          <a:ext cx="0" cy="0"/>
+          <a:chOff x="0" y="0"/>
+          <a:chExt cx="0" cy="0"/>
+        </a:xfrm>
+      </p:grpSpPr>
+      <p:sp xmlns:r="http://schemas.openxmlformats.org/officeDocument/2006/relationships">
+        <p:nvSpPr>
+          <p:cNvPr id="2" name="Title 1"/>
+          <p:cNvSpPr>
+            <a:spLocks noGrp="1"/>
+          </p:cNvSpPr>
+          <p:nvPr>
+            <p:ph type="title"/>
+          </p:nvPr>
+        </p:nvSpPr>
+        <p:spPr/>
+        <p:txBody>
+          <a:bodyPr/>
+          <a:lstStyle/>
+          <a:p>
+            <a:r>
+              <a:rPr lang="en-US"/>
+              <a:t>My third page</a:t>
+            </a:r>
+            <a:endParaRPr lang="en-US" smtClean="0"/>
+          </a:p>
+        </p:txBody>
+      </p:sp>
+      <p:sp xmlns:r="http://schemas.openxmlformats.org/officeDocument/2006/relationships">
+        <p:nvSpPr>
+          <p:cNvPr id="3" name="Content Placeholder 2"/>
+          <p:cNvSpPr>
+            <a:spLocks noGrp="1"/>
+          </p:cNvSpPr>
+          <p:nvPr>
+            <p:ph idx="1"/>
+          </p:nvPr>
+        </p:nvSpPr>
+        <p:spPr/>
+        <p:txBody>
+          <a:bodyPr/>
+          <a:lstStyle/>
+          <a:p>
+            <a:pPr lvl="0"/>
+            <a:r>
+              <a:rPr lang="en-US"/>
+              <a:t>ABCDE</a:t>
             </a:r>
             <a:endParaRPr lang="en-US" smtClean="0"/>
           </a:p>

</xml_diff>

<commit_message>
Fix partiel de code malchié
</commit_message>
<xml_diff>
--- a/JsonConverter/src/main/resources/OutputFolder/test.pptx
+++ b/JsonConverter/src/main/resources/OutputFolder/test.pptx
@@ -3060,6 +3060,81 @@
           <a:chExt cx="0" cy="0"/>
         </a:xfrm>
       </p:grpSpPr>
+      <p:sp xmlns:r="http://schemas.openxmlformats.org/officeDocument/2006/relationships">
+        <p:nvSpPr>
+          <p:cNvPr id="2" name="Title 1"/>
+          <p:cNvSpPr>
+            <a:spLocks noGrp="1"/>
+          </p:cNvSpPr>
+          <p:nvPr>
+            <p:ph type="title"/>
+          </p:nvPr>
+        </p:nvSpPr>
+        <p:spPr/>
+        <p:txBody>
+          <a:bodyPr/>
+          <a:lstStyle/>
+          <a:p>
+            <a:r>
+              <a:rPr lang="en-US" smtClean="0"/>
+              <a:t>Click to edit Master title style</a:t>
+            </a:r>
+            <a:endParaRPr lang="en-US"/>
+          </a:p>
+        </p:txBody>
+      </p:sp>
+      <p:sp xmlns:r="http://schemas.openxmlformats.org/officeDocument/2006/relationships">
+        <p:nvSpPr>
+          <p:cNvPr id="3" name="Content Placeholder 2"/>
+          <p:cNvSpPr>
+            <a:spLocks noGrp="1"/>
+          </p:cNvSpPr>
+          <p:nvPr>
+            <p:ph idx="1"/>
+          </p:nvPr>
+        </p:nvSpPr>
+        <p:spPr/>
+        <p:txBody>
+          <a:bodyPr/>
+          <a:lstStyle/>
+          <a:p>
+            <a:pPr lvl="0"/>
+            <a:r>
+              <a:rPr lang="en-US" smtClean="0"/>
+              <a:t>Click to edit Master text styles</a:t>
+            </a:r>
+          </a:p>
+          <a:p>
+            <a:pPr lvl="1"/>
+            <a:r>
+              <a:rPr lang="en-US" smtClean="0"/>
+              <a:t>Second level</a:t>
+            </a:r>
+          </a:p>
+          <a:p>
+            <a:pPr lvl="2"/>
+            <a:r>
+              <a:rPr lang="en-US" smtClean="0"/>
+              <a:t>Third level</a:t>
+            </a:r>
+          </a:p>
+          <a:p>
+            <a:pPr lvl="3"/>
+            <a:r>
+              <a:rPr lang="en-US" smtClean="0"/>
+              <a:t>Fourth level</a:t>
+            </a:r>
+          </a:p>
+          <a:p>
+            <a:pPr lvl="4"/>
+            <a:r>
+              <a:rPr lang="en-US" smtClean="0"/>
+              <a:t>Fifth level</a:t>
+            </a:r>
+            <a:endParaRPr lang="en-US"/>
+          </a:p>
+        </p:txBody>
+      </p:sp>
     </p:spTree>
   </p:cSld>
   <p:clrMapOvr>
@@ -3085,6 +3160,81 @@
           <a:chExt cx="0" cy="0"/>
         </a:xfrm>
       </p:grpSpPr>
+      <p:sp xmlns:r="http://schemas.openxmlformats.org/officeDocument/2006/relationships">
+        <p:nvSpPr>
+          <p:cNvPr id="2" name="Title 1"/>
+          <p:cNvSpPr>
+            <a:spLocks noGrp="1"/>
+          </p:cNvSpPr>
+          <p:nvPr>
+            <p:ph type="title"/>
+          </p:nvPr>
+        </p:nvSpPr>
+        <p:spPr/>
+        <p:txBody>
+          <a:bodyPr/>
+          <a:lstStyle/>
+          <a:p>
+            <a:r>
+              <a:rPr lang="en-US" smtClean="0"/>
+              <a:t>Click to edit Master title style</a:t>
+            </a:r>
+            <a:endParaRPr lang="en-US"/>
+          </a:p>
+        </p:txBody>
+      </p:sp>
+      <p:sp xmlns:r="http://schemas.openxmlformats.org/officeDocument/2006/relationships">
+        <p:nvSpPr>
+          <p:cNvPr id="3" name="Content Placeholder 2"/>
+          <p:cNvSpPr>
+            <a:spLocks noGrp="1"/>
+          </p:cNvSpPr>
+          <p:nvPr>
+            <p:ph idx="1"/>
+          </p:nvPr>
+        </p:nvSpPr>
+        <p:spPr/>
+        <p:txBody>
+          <a:bodyPr/>
+          <a:lstStyle/>
+          <a:p>
+            <a:pPr lvl="0"/>
+            <a:r>
+              <a:rPr lang="en-US" smtClean="0"/>
+              <a:t>Click to edit Master text styles</a:t>
+            </a:r>
+          </a:p>
+          <a:p>
+            <a:pPr lvl="1"/>
+            <a:r>
+              <a:rPr lang="en-US" smtClean="0"/>
+              <a:t>Second level</a:t>
+            </a:r>
+          </a:p>
+          <a:p>
+            <a:pPr lvl="2"/>
+            <a:r>
+              <a:rPr lang="en-US" smtClean="0"/>
+              <a:t>Third level</a:t>
+            </a:r>
+          </a:p>
+          <a:p>
+            <a:pPr lvl="3"/>
+            <a:r>
+              <a:rPr lang="en-US" smtClean="0"/>
+              <a:t>Fourth level</a:t>
+            </a:r>
+          </a:p>
+          <a:p>
+            <a:pPr lvl="4"/>
+            <a:r>
+              <a:rPr lang="en-US" smtClean="0"/>
+              <a:t>Fifth level</a:t>
+            </a:r>
+            <a:endParaRPr lang="en-US"/>
+          </a:p>
+        </p:txBody>
+      </p:sp>
     </p:spTree>
   </p:cSld>
   <p:clrMapOvr>

</xml_diff>

<commit_message>
Huge reverse engineering of how the whole API worked, not it works.
</commit_message>
<xml_diff>
--- a/JsonConverter/src/main/resources/OutputFolder/test.pptx
+++ b/JsonConverter/src/main/resources/OutputFolder/test.pptx
@@ -3076,10 +3076,14 @@
           <a:lstStyle/>
           <a:p>
             <a:r>
-              <a:rPr lang="en-US" smtClean="0"/>
-              <a:t>Click to edit Master title style</a:t>
-            </a:r>
-            <a:endParaRPr lang="en-US"/>
+              <a:rPr lang="en-US" sz="2400">
+                <a:solidFill>
+                  <a:srgbClr val="000000"/>
+                </a:solidFill>
+                <a:latin typeface="Calibri"/>
+              </a:rPr>
+              <a:t>This is a title</a:t>
+            </a:r>
           </a:p>
         </p:txBody>
       </p:sp>
@@ -3098,40 +3102,15 @@
           <a:bodyPr/>
           <a:lstStyle/>
           <a:p>
-            <a:pPr lvl="0"/>
-            <a:r>
-              <a:rPr lang="en-US" smtClean="0"/>
-              <a:t>Click to edit Master text styles</a:t>
-            </a:r>
-          </a:p>
-          <a:p>
-            <a:pPr lvl="1"/>
-            <a:r>
-              <a:rPr lang="en-US" smtClean="0"/>
-              <a:t>Second level</a:t>
-            </a:r>
-          </a:p>
-          <a:p>
-            <a:pPr lvl="2"/>
-            <a:r>
-              <a:rPr lang="en-US" smtClean="0"/>
-              <a:t>Third level</a:t>
-            </a:r>
-          </a:p>
-          <a:p>
-            <a:pPr lvl="3"/>
-            <a:r>
-              <a:rPr lang="en-US" smtClean="0"/>
-              <a:t>Fourth level</a:t>
-            </a:r>
-          </a:p>
-          <a:p>
-            <a:pPr lvl="4"/>
-            <a:r>
-              <a:rPr lang="en-US" smtClean="0"/>
-              <a:t>Fifth level</a:t>
-            </a:r>
-            <a:endParaRPr lang="en-US"/>
+            <a:r>
+              <a:rPr lang="en-US" sz="1200">
+                <a:solidFill>
+                  <a:srgbClr val="000000"/>
+                </a:solidFill>
+                <a:latin typeface="Calibri"/>
+              </a:rPr>
+              <a:t>test</a:t>
+            </a:r>
           </a:p>
         </p:txBody>
       </p:sp>
@@ -3176,10 +3155,14 @@
           <a:lstStyle/>
           <a:p>
             <a:r>
-              <a:rPr lang="en-US" smtClean="0"/>
-              <a:t>Click to edit Master title style</a:t>
-            </a:r>
-            <a:endParaRPr lang="en-US"/>
+              <a:rPr lang="en-US" sz="1500">
+                <a:solidFill>
+                  <a:srgbClr val="000000"/>
+                </a:solidFill>
+                <a:latin typeface="Calibri"/>
+              </a:rPr>
+              <a:t>Yes</a:t>
+            </a:r>
           </a:p>
         </p:txBody>
       </p:sp>

</xml_diff>

<commit_message>
Titles are now supported.
</commit_message>
<xml_diff>
--- a/JsonConverter/src/main/resources/OutputFolder/test.pptx
+++ b/JsonConverter/src/main/resources/OutputFolder/test.pptx
@@ -3076,10 +3076,14 @@
           <a:lstStyle/>
           <a:p>
             <a:r>
-              <a:rPr lang="en-US" smtClean="0"/>
-              <a:t>Click to edit Master title style</a:t>
-            </a:r>
-            <a:endParaRPr lang="en-US"/>
+              <a:rPr lang="en-US" sz="2400">
+                <a:solidFill>
+                  <a:srgbClr val="000000"/>
+                </a:solidFill>
+                <a:latin typeface="Calibri"/>
+              </a:rPr>
+              <a:t>This is a title</a:t>
+            </a:r>
           </a:p>
         </p:txBody>
       </p:sp>
@@ -3098,40 +3102,15 @@
           <a:bodyPr/>
           <a:lstStyle/>
           <a:p>
-            <a:pPr lvl="0"/>
-            <a:r>
-              <a:rPr lang="en-US" smtClean="0"/>
-              <a:t>Click to edit Master text styles</a:t>
-            </a:r>
-          </a:p>
-          <a:p>
-            <a:pPr lvl="1"/>
-            <a:r>
-              <a:rPr lang="en-US" smtClean="0"/>
-              <a:t>Second level</a:t>
-            </a:r>
-          </a:p>
-          <a:p>
-            <a:pPr lvl="2"/>
-            <a:r>
-              <a:rPr lang="en-US" smtClean="0"/>
-              <a:t>Third level</a:t>
-            </a:r>
-          </a:p>
-          <a:p>
-            <a:pPr lvl="3"/>
-            <a:r>
-              <a:rPr lang="en-US" smtClean="0"/>
-              <a:t>Fourth level</a:t>
-            </a:r>
-          </a:p>
-          <a:p>
-            <a:pPr lvl="4"/>
-            <a:r>
-              <a:rPr lang="en-US" smtClean="0"/>
-              <a:t>Fifth level</a:t>
-            </a:r>
-            <a:endParaRPr lang="en-US"/>
+            <a:r>
+              <a:rPr lang="en-US" sz="1200">
+                <a:solidFill>
+                  <a:srgbClr val="FF0000"/>
+                </a:solidFill>
+                <a:latin typeface="Calibri"/>
+              </a:rPr>
+              <a:t>test</a:t>
+            </a:r>
           </a:p>
         </p:txBody>
       </p:sp>
@@ -3176,10 +3155,14 @@
           <a:lstStyle/>
           <a:p>
             <a:r>
-              <a:rPr lang="en-US" smtClean="0"/>
-              <a:t>Click to edit Master title style</a:t>
-            </a:r>
-            <a:endParaRPr lang="en-US"/>
+              <a:rPr lang="en-US" sz="4400">
+                <a:solidFill>
+                  <a:srgbClr val="0000FF"/>
+                </a:solidFill>
+                <a:latin typeface="Calibri"/>
+              </a:rPr>
+              <a:t>Yes</a:t>
+            </a:r>
           </a:p>
         </p:txBody>
       </p:sp>

</xml_diff>

<commit_message>
Implemented the title only
</commit_message>
<xml_diff>
--- a/JsonConverter/src/main/resources/OutputFolder/test.pptx
+++ b/JsonConverter/src/main/resources/OutputFolder/test.pptx
@@ -7,6 +7,7 @@
   <p:sldIdLst>
     <p:sldId id="256" r:id="rId6"/>
     <p:sldId id="257" r:id="rId7"/>
+    <p:sldId id="258" r:id="rId8"/>
   </p:sldIdLst>
   <p:sldSz cx="9144000" cy="6858000" type="screen4x3"/>
   <p:notesSz cx="6858000" cy="9144000"/>
@@ -3076,7 +3077,7 @@
           <a:lstStyle/>
           <a:p>
             <a:r>
-              <a:rPr lang="en-US" sz="2400">
+              <a:rPr lang="en-US" sz="2400" b="true" i="true" strike="noStrike" u="none">
                 <a:solidFill>
                   <a:srgbClr val="000000"/>
                 </a:solidFill>
@@ -3103,13 +3104,14 @@
           <a:lstStyle/>
           <a:p>
             <a:r>
-              <a:rPr lang="en-US" sz="1200">
+              <a:rPr lang="en-US" sz="1200" b="false" i="false" strike="sngStrike" u="sng">
                 <a:solidFill>
                   <a:srgbClr val="FF0000"/>
                 </a:solidFill>
                 <a:latin typeface="Calibri"/>
               </a:rPr>
-              <a:t>test</a:t>
+              <a:t>test adihwaudhwahid Decorations 
+ Yes sir</a:t>
             </a:r>
           </a:p>
         </p:txBody>
@@ -3155,7 +3157,7 @@
           <a:lstStyle/>
           <a:p>
             <a:r>
-              <a:rPr lang="en-US" sz="4400">
+              <a:rPr lang="en-US" sz="4400" b="false" i="false" strike="noStrike" u="none">
                 <a:solidFill>
                   <a:srgbClr val="0000FF"/>
                 </a:solidFill>
@@ -3216,6 +3218,74 @@
             </a:r>
             <a:endParaRPr lang="en-US"/>
           </a:p>
+        </p:txBody>
+      </p:sp>
+    </p:spTree>
+  </p:cSld>
+  <p:clrMapOvr>
+    <a:masterClrMapping/>
+  </p:clrMapOvr>
+</p:sld>
+</file>
+
+<file path=ppt/slides/slide3.xml><?xml version="1.0" encoding="utf-8"?>
+<p:sld xmlns:p="http://schemas.openxmlformats.org/presentationml/2006/main" xmlns:a="http://schemas.openxmlformats.org/drawingml/2006/main">
+  <p:cSld>
+    <p:spTree>
+      <p:nvGrpSpPr>
+        <p:cNvPr id="1" name=""/>
+        <p:cNvGrpSpPr/>
+        <p:nvPr/>
+      </p:nvGrpSpPr>
+      <p:grpSpPr>
+        <a:xfrm>
+          <a:off x="0" y="0"/>
+          <a:ext cx="0" cy="0"/>
+          <a:chOff x="0" y="0"/>
+          <a:chExt cx="0" cy="0"/>
+        </a:xfrm>
+      </p:grpSpPr>
+      <p:sp xmlns:r="http://schemas.openxmlformats.org/officeDocument/2006/relationships">
+        <p:nvSpPr>
+          <p:cNvPr id="2" name="Title 1"/>
+          <p:cNvSpPr>
+            <a:spLocks noGrp="1"/>
+          </p:cNvSpPr>
+          <p:nvPr>
+            <p:ph type="title"/>
+          </p:nvPr>
+        </p:nvSpPr>
+        <p:spPr/>
+        <p:txBody>
+          <a:bodyPr/>
+          <a:lstStyle/>
+          <a:p>
+            <a:r>
+              <a:rPr lang="en-US" sz="2400" b="true" i="true" strike="noStrike" u="none">
+                <a:solidFill>
+                  <a:srgbClr val="000000"/>
+                </a:solidFill>
+                <a:latin typeface="Calibri"/>
+              </a:rPr>
+              <a:t>This is a List</a:t>
+            </a:r>
+          </a:p>
+        </p:txBody>
+      </p:sp>
+      <p:sp xmlns:r="http://schemas.openxmlformats.org/officeDocument/2006/relationships">
+        <p:nvSpPr>
+          <p:cNvPr id="3" name="Content Placeholder 2"/>
+          <p:cNvSpPr>
+            <a:spLocks noGrp="1"/>
+          </p:cNvSpPr>
+          <p:nvPr>
+            <p:ph idx="1"/>
+          </p:nvPr>
+        </p:nvSpPr>
+        <p:spPr/>
+        <p:txBody>
+          <a:bodyPr/>
+          <a:lstStyle/>
         </p:txBody>
       </p:sp>
     </p:spTree>

</xml_diff>

<commit_message>
A little bit of error handling
</commit_message>
<xml_diff>
--- a/JsonConverter/src/main/resources/OutputFolder/test.pptx
+++ b/JsonConverter/src/main/resources/OutputFolder/test.pptx
@@ -3077,7 +3077,7 @@
           <a:lstStyle/>
           <a:p>
             <a:r>
-              <a:rPr lang="en-US" sz="2400">
+              <a:rPr lang="en-US" sz="2400" b="true" i="true" strike="noStrike" u="none">
                 <a:solidFill>
                   <a:srgbClr val="000000"/>
                 </a:solidFill>
@@ -3104,7 +3104,7 @@
           <a:lstStyle/>
           <a:p>
             <a:r>
-              <a:rPr lang="en-US" sz="1200">
+              <a:rPr lang="en-US" sz="1200" b="false" i="false" strike="sngStrike" u="sng">
                 <a:solidFill>
                   <a:srgbClr val="FF0000"/>
                 </a:solidFill>
@@ -3157,7 +3157,7 @@
           <a:lstStyle/>
           <a:p>
             <a:r>
-              <a:rPr lang="en-US" sz="4400">
+              <a:rPr lang="en-US" sz="4400" b="false" i="false" strike="noStrike" u="none">
                 <a:solidFill>
                   <a:srgbClr val="0000FF"/>
                 </a:solidFill>
@@ -3261,7 +3261,7 @@
           <a:lstStyle/>
           <a:p>
             <a:r>
-              <a:rPr lang="en-US" sz="2400">
+              <a:rPr lang="en-US" sz="2400" b="true" i="true" strike="noStrike" u="none">
                 <a:solidFill>
                   <a:srgbClr val="000000"/>
                 </a:solidFill>
@@ -3287,40 +3287,37 @@
           <a:bodyPr/>
           <a:lstStyle/>
           <a:p>
-            <a:pPr lvl="0"/>
-            <a:r>
-              <a:rPr lang="en-US" smtClean="0"/>
-              <a:t>Click to edit Master text styles</a:t>
-            </a:r>
-          </a:p>
-          <a:p>
-            <a:pPr lvl="1"/>
-            <a:r>
-              <a:rPr lang="en-US" smtClean="0"/>
-              <a:t>Second level</a:t>
-            </a:r>
-          </a:p>
-          <a:p>
-            <a:pPr lvl="2"/>
-            <a:r>
-              <a:rPr lang="en-US" smtClean="0"/>
-              <a:t>Third level</a:t>
-            </a:r>
-          </a:p>
-          <a:p>
-            <a:pPr lvl="3"/>
-            <a:r>
-              <a:rPr lang="en-US" smtClean="0"/>
-              <a:t>Fourth level</a:t>
-            </a:r>
-          </a:p>
-          <a:p>
-            <a:pPr lvl="4"/>
-            <a:r>
-              <a:rPr lang="en-US" smtClean="0"/>
-              <a:t>Fifth level</a:t>
-            </a:r>
-            <a:endParaRPr lang="en-US"/>
+            <a:r>
+              <a:rPr lang="en-US" sz="1600" b="false" i="false" strike="noStrike" u="none">
+                <a:solidFill>
+                  <a:srgbClr val="FF0000"/>
+                </a:solidFill>
+                <a:latin typeface="Calibri"/>
+              </a:rPr>
+              <a:t>R</a:t>
+            </a:r>
+          </a:p>
+          <a:p>
+            <a:r>
+              <a:rPr lang="en-US" sz="1600" b="false" i="false" strike="noStrike" u="none">
+                <a:solidFill>
+                  <a:srgbClr val="00FF00"/>
+                </a:solidFill>
+                <a:latin typeface="Calibri"/>
+              </a:rPr>
+              <a:t>G</a:t>
+            </a:r>
+          </a:p>
+          <a:p>
+            <a:r>
+              <a:rPr lang="en-US" sz="1600" b="false" i="false" strike="noStrike" u="none">
+                <a:solidFill>
+                  <a:srgbClr val="0000FF"/>
+                </a:solidFill>
+                <a:latin typeface="Calibri"/>
+              </a:rPr>
+              <a:t>B</a:t>
+            </a:r>
           </a:p>
         </p:txBody>
       </p:sp>

</xml_diff>

<commit_message>
OOGA BOOGA Shit is now broken
</commit_message>
<xml_diff>
--- a/JsonConverter/src/main/resources/OutputFolder/test.pptx
+++ b/JsonConverter/src/main/resources/OutputFolder/test.pptx
@@ -3182,42 +3182,6 @@
         <p:txBody>
           <a:bodyPr/>
           <a:lstStyle/>
-          <a:p>
-            <a:pPr lvl="0"/>
-            <a:r>
-              <a:rPr lang="en-US" smtClean="0"/>
-              <a:t>Click to edit Master text styles</a:t>
-            </a:r>
-          </a:p>
-          <a:p>
-            <a:pPr lvl="1"/>
-            <a:r>
-              <a:rPr lang="en-US" smtClean="0"/>
-              <a:t>Second level</a:t>
-            </a:r>
-          </a:p>
-          <a:p>
-            <a:pPr lvl="2"/>
-            <a:r>
-              <a:rPr lang="en-US" smtClean="0"/>
-              <a:t>Third level</a:t>
-            </a:r>
-          </a:p>
-          <a:p>
-            <a:pPr lvl="3"/>
-            <a:r>
-              <a:rPr lang="en-US" smtClean="0"/>
-              <a:t>Fourth level</a:t>
-            </a:r>
-          </a:p>
-          <a:p>
-            <a:pPr lvl="4"/>
-            <a:r>
-              <a:rPr lang="en-US" smtClean="0"/>
-              <a:t>Fifth level</a:t>
-            </a:r>
-            <a:endParaRPr lang="en-US"/>
-          </a:p>
         </p:txBody>
       </p:sp>
       <p:pic>
@@ -3236,7 +3200,7 @@
         </p:blipFill>
         <p:spPr>
           <a:xfrm>
-            <a:off x="127000" y="127000"/>
+            <a:off x="3175000" y="3175000"/>
             <a:ext cx="127000" cy="127000"/>
           </a:xfrm>
           <a:prstGeom prst="rect">

</xml_diff>

<commit_message>
Images are now official
</commit_message>
<xml_diff>
--- a/JsonConverter/src/main/resources/OutputFolder/test.pptx
+++ b/JsonConverter/src/main/resources/OutputFolder/test.pptx
@@ -3206,8 +3206,8 @@
         </p:blipFill>
         <p:spPr>
           <a:xfrm>
-            <a:off x="3175000" y="3175000"/>
-            <a:ext cx="127000" cy="127000"/>
+            <a:off x="457200" y="1600200"/>
+            <a:ext cx="8229600" cy="4525963"/>
           </a:xfrm>
           <a:prstGeom prst="rect">
             <a:avLst/>

</xml_diff>

<commit_message>
Added and completed most test
</commit_message>
<xml_diff>
--- a/JsonConverter/src/main/resources/OutputFolder/test.pptx
+++ b/JsonConverter/src/main/resources/OutputFolder/test.pptx
@@ -3074,13 +3074,13 @@
         </p:nvSpPr>
         <p:spPr/>
         <p:txBody>
-          <a:bodyPr anchor="ctr"/>
+          <a:bodyPr/>
           <a:lstStyle/>
           <a:p>
             <a:r>
               <a:rPr lang="en-US" sz="4400" b="false" i="false" strike="noStrike" u="none">
                 <a:solidFill>
-                  <a:srgbClr val="FFC800"/>
+                  <a:srgbClr val="000000"/>
                 </a:solidFill>
                 <a:latin typeface="Algerian"/>
               </a:rPr>

</xml_diff>

<commit_message>
Done with java doc
</commit_message>
<xml_diff>
--- a/JsonConverter/src/main/resources/OutputFolder/test.pptx
+++ b/JsonConverter/src/main/resources/OutputFolder/test.pptx
@@ -3080,7 +3080,7 @@
             <a:r>
               <a:rPr lang="en-US" sz="4400" b="false" i="false" strike="noStrike" u="none">
                 <a:solidFill>
-                  <a:srgbClr val="000000"/>
+                  <a:srgbClr val="FFFFFF"/>
                 </a:solidFill>
                 <a:latin typeface="Algerian"/>
               </a:rPr>
@@ -3130,9 +3130,9 @@
           <a:lstStyle/>
           <a:p>
             <a:r>
-              <a:rPr lang="en-US" sz="2400" b="true" i="true" strike="noStrike" u="none">
-                <a:solidFill>
-                  <a:srgbClr val="000000"/>
+              <a:rPr lang="en-US" sz="2400" b="true" i="true" strike="sngStrike" u="sng">
+                <a:solidFill>
+                  <a:srgbClr val="C0C0C0"/>
                 </a:solidFill>
                 <a:latin typeface="Calibri"/>
               </a:rPr>
@@ -3157,14 +3157,13 @@
           <a:lstStyle/>
           <a:p>
             <a:r>
-              <a:rPr lang="en-US" sz="1200" b="false" i="false" strike="sngStrike" u="sng">
-                <a:solidFill>
-                  <a:srgbClr val="FF0000"/>
+              <a:rPr lang="en-US" sz="1200" b="false" i="true" strike="sngStrike" u="sng">
+                <a:solidFill>
+                  <a:srgbClr val="808080"/>
                 </a:solidFill>
                 <a:latin typeface="Calibri"/>
               </a:rPr>
-              <a:t>test adihwaudhwahid Decorations 
- Yes sir</a:t>
+              <a:t>test adihwaudhwahid Decorations</a:t>
             </a:r>
           </a:p>
         </p:txBody>
@@ -3364,6 +3363,127 @@
                 <a:latin typeface="Calibri"/>
               </a:rPr>
               <a:t>B</a:t>
+            </a:r>
+          </a:p>
+          <a:p>
+            <a:r>
+              <a:rPr lang="en-US" sz="1200" b="true" i="false" strike="sngStrike" u="sng">
+                <a:solidFill>
+                  <a:srgbClr val="404040"/>
+                </a:solidFill>
+                <a:latin typeface="Calibri"/>
+              </a:rPr>
+              <a:t>test adihwaudhwahid Decorations</a:t>
+            </a:r>
+          </a:p>
+          <a:p>
+            <a:r>
+              <a:rPr lang="en-US" sz="1200" b="true" i="true" strike="sngStrike" u="none">
+                <a:solidFill>
+                  <a:srgbClr val="000000"/>
+                </a:solidFill>
+                <a:latin typeface="Calibri"/>
+              </a:rPr>
+              <a:t>test adihwaudhwahid Decorations</a:t>
+            </a:r>
+          </a:p>
+          <a:p>
+            <a:r>
+              <a:rPr lang="en-US" sz="1200" b="true" i="true" strike="noStrike" u="sng">
+                <a:solidFill>
+                  <a:srgbClr val="FF0000"/>
+                </a:solidFill>
+                <a:latin typeface="Calibri"/>
+              </a:rPr>
+              <a:t>test adihwaudhwahid Decorations</a:t>
+            </a:r>
+          </a:p>
+          <a:p>
+            <a:r>
+              <a:rPr lang="en-US" sz="1200" b="false" i="false" strike="noStrike" u="none">
+                <a:solidFill>
+                  <a:srgbClr val="FFAFAF"/>
+                </a:solidFill>
+                <a:latin typeface="Calibri"/>
+              </a:rPr>
+              <a:t>test adihwaudhwahid Decorations</a:t>
+            </a:r>
+          </a:p>
+          <a:p>
+            <a:r>
+              <a:rPr lang="en-US" sz="1200" b="false" i="false" strike="sngStrike" u="none">
+                <a:solidFill>
+                  <a:srgbClr val="FFC800"/>
+                </a:solidFill>
+                <a:latin typeface="Calibri"/>
+              </a:rPr>
+              <a:t>test adihwaudhwahid Decorations</a:t>
+            </a:r>
+          </a:p>
+          <a:p>
+            <a:r>
+              <a:rPr lang="en-US" sz="1200" b="true" i="false" strike="noStrike" u="sng">
+                <a:solidFill>
+                  <a:srgbClr val="FFFF00"/>
+                </a:solidFill>
+                <a:latin typeface="Calibri"/>
+              </a:rPr>
+              <a:t>test adihwaudhwahid Decorations</a:t>
+            </a:r>
+          </a:p>
+          <a:p>
+            <a:r>
+              <a:rPr lang="en-US" sz="1200" b="true" i="false" strike="sngStrike" u="sng">
+                <a:solidFill>
+                  <a:srgbClr val="00FF00"/>
+                </a:solidFill>
+                <a:latin typeface="Calibri"/>
+              </a:rPr>
+              <a:t>test adihwaudhwahid Decorations</a:t>
+            </a:r>
+          </a:p>
+          <a:p>
+            <a:r>
+              <a:rPr lang="en-US" sz="1200" b="false" i="true" strike="noStrike" u="sng">
+                <a:solidFill>
+                  <a:srgbClr val="FF00FF"/>
+                </a:solidFill>
+                <a:latin typeface="Calibri"/>
+              </a:rPr>
+              <a:t>test adihwaudhwahid Decorations</a:t>
+            </a:r>
+          </a:p>
+          <a:p>
+            <a:r>
+              <a:rPr lang="en-US" sz="1200" b="true" i="false" strike="noStrike" u="none">
+                <a:solidFill>
+                  <a:srgbClr val="00FFFF"/>
+                </a:solidFill>
+                <a:latin typeface="Calibri"/>
+              </a:rPr>
+              <a:t>test adihwaudhwahid Decorations</a:t>
+            </a:r>
+          </a:p>
+          <a:p>
+            <a:r>
+              <a:rPr lang="en-US" sz="1200" b="false" i="false" strike="sngStrike" u="sng">
+                <a:solidFill>
+                  <a:srgbClr val="0000FF"/>
+                </a:solidFill>
+                <a:latin typeface="Calibri"/>
+              </a:rPr>
+              <a:t>test adihwaudhwahid Decorations</a:t>
+            </a:r>
+          </a:p>
+          <a:p>
+            <a:r>
+              <a:rPr lang="en-US" sz="1200" b="false" i="false" strike="sngStrike" u="sng">
+                <a:solidFill>
+                  <a:srgbClr val="000000"/>
+                </a:solidFill>
+                <a:latin typeface="Calibri"/>
+              </a:rPr>
+              <a:t>test adihwaudhwahid Decorations</a:t>
             </a:r>
           </a:p>
         </p:txBody>

</xml_diff>